<commit_message>
Update deploy doc for v5.4.130716
</commit_message>
<xml_diff>
--- a/10_Sony_Select_Service/Deploy/v5.4.130716/Deploy Plan/Sony Select Service Deployment Plan(v5.4.130716).pptx
+++ b/10_Sony_Select_Service/Deploy/v5.4.130716/Deploy Plan/Sony Select Service Deployment Plan(v5.4.130716).pptx
@@ -259,7 +259,7 @@
               <a:pPr>
                 <a:defRPr/>
               </a:pPr>
-              <a:t>2013/7/30</a:t>
+              <a:t>2013/7/31</a:t>
             </a:fld>
             <a:endParaRPr lang="ja-JP" altLang="en-US" dirty="0"/>
           </a:p>
@@ -3117,7 +3117,7 @@
           <a:lstStyle/>
           <a:p>
             <a:pPr algn="r"/>
-            <a:fld id="{EFABFBF5-CD37-4387-8113-89398AAFD8BA}" type="slidenum">
+            <a:fld id="{3C99BC1E-73B0-45D9-9BCF-D5BB4F33AA83}" type="slidenum">
               <a:rPr lang="en-US" sz="750" b="0" smtClean="0">
                 <a:solidFill>
                   <a:srgbClr val="7F7F7F"/>
@@ -3740,14 +3740,7 @@
                 <a:latin typeface="宋体" pitchFamily="2" charset="-122"/>
                 <a:ea typeface="宋体" pitchFamily="2" charset="-122"/>
               </a:rPr>
-              <a:t>Yi</a:t>
-            </a:r>
-            <a:r>
-              <a:rPr lang="en-US" altLang="zh-CN" sz="2000" smtClean="0">
-                <a:latin typeface="宋体" pitchFamily="2" charset="-122"/>
-                <a:ea typeface="宋体" pitchFamily="2" charset="-122"/>
-              </a:rPr>
-              <a:t>, Tao</a:t>
+              <a:t>Yi, Tao</a:t>
             </a:r>
             <a:endParaRPr lang="en-US" altLang="zh-CN" sz="2000" dirty="0" smtClean="0">
               <a:latin typeface="宋体" pitchFamily="2" charset="-122"/>
@@ -5452,7 +5445,27 @@
                 <a:latin typeface="宋体"/>
                 <a:ea typeface="宋体"/>
               </a:rPr>
-              <a:t>修复问题</a:t>
+              <a:t>修复问题（</a:t>
+            </a:r>
+            <a:r>
+              <a:rPr lang="en-US" altLang="zh-CN" sz="1400" dirty="0" smtClean="0">
+                <a:solidFill>
+                  <a:sysClr val="windowText" lastClr="000000"/>
+                </a:solidFill>
+                <a:latin typeface="宋体"/>
+                <a:ea typeface="宋体"/>
+              </a:rPr>
+              <a:t>@Version</a:t>
+            </a:r>
+            <a:r>
+              <a:rPr lang="zh-CN" altLang="en-US" sz="1400" dirty="0" smtClean="0">
+                <a:solidFill>
+                  <a:sysClr val="windowText" lastClr="000000"/>
+                </a:solidFill>
+                <a:latin typeface="宋体"/>
+                <a:ea typeface="宋体"/>
+              </a:rPr>
+              <a:t>为首次发现问题版本）</a:t>
             </a:r>
             <a:r>
               <a:rPr lang="en-US" altLang="en-US" sz="1400" dirty="0" smtClean="0">
@@ -5463,6 +5476,12 @@
               </a:rPr>
               <a:t>:</a:t>
             </a:r>
+            <a:endParaRPr lang="en-US" altLang="en-US" sz="1400" dirty="0" smtClean="0">
+              <a:solidFill>
+                <a:sysClr val="windowText" lastClr="000000"/>
+              </a:solidFill>
+              <a:latin typeface="+mn-ea"/>
+            </a:endParaRPr>
           </a:p>
           <a:p>
             <a:pPr lvl="2" indent="274320" fontAlgn="auto">
@@ -5489,7 +5508,19 @@
             </a:r>
             <a:r>
               <a:rPr lang="en-US" altLang="zh-CN" sz="1200" dirty="0" smtClean="0"/>
-              <a:t>issue</a:t>
+              <a:t>issue(@</a:t>
+            </a:r>
+            <a:r>
+              <a:rPr lang="en-US" altLang="zh-CN" sz="1200" dirty="0" smtClean="0"/>
+              <a:t>V</a:t>
+            </a:r>
+            <a:r>
+              <a:rPr lang="en-US" sz="1200" dirty="0" smtClean="0"/>
+              <a:t>5.4.130606</a:t>
+            </a:r>
+            <a:r>
+              <a:rPr lang="en-US" altLang="zh-CN" sz="1200" dirty="0" smtClean="0"/>
+              <a:t>)</a:t>
             </a:r>
             <a:endParaRPr lang="en-US" sz="1200" dirty="0" smtClean="0"/>
           </a:p>
@@ -5512,6 +5543,23 @@
               <a:rPr lang="en-US" sz="1200" dirty="0" smtClean="0"/>
               <a:t>Log transfer performance issue</a:t>
             </a:r>
+            <a:r>
+              <a:rPr lang="en-US" altLang="zh-CN" sz="1200" dirty="0" smtClean="0"/>
+              <a:t> (@</a:t>
+            </a:r>
+            <a:r>
+              <a:rPr lang="en-US" altLang="zh-CN" sz="1200" dirty="0" smtClean="0"/>
+              <a:t>V</a:t>
+            </a:r>
+            <a:r>
+              <a:rPr lang="en-US" sz="1200" dirty="0" smtClean="0"/>
+              <a:t>5.2.5</a:t>
+            </a:r>
+            <a:r>
+              <a:rPr lang="en-US" altLang="zh-CN" sz="1200" dirty="0" smtClean="0"/>
+              <a:t>)</a:t>
+            </a:r>
+            <a:endParaRPr lang="en-US" sz="1200" dirty="0" smtClean="0"/>
           </a:p>
           <a:p>
             <a:pPr lvl="2" indent="274320" fontAlgn="auto">
@@ -5538,6 +5586,22 @@
                 <a:ea typeface="宋体" pitchFamily="2" charset="-122"/>
               </a:rPr>
               <a:t>中去掉首页版本号的显示</a:t>
+            </a:r>
+            <a:r>
+              <a:rPr lang="en-US" altLang="zh-CN" sz="1200" dirty="0" smtClean="0"/>
+              <a:t>(@</a:t>
+            </a:r>
+            <a:r>
+              <a:rPr lang="en-US" altLang="zh-CN" sz="1200" dirty="0" smtClean="0"/>
+              <a:t>V</a:t>
+            </a:r>
+            <a:r>
+              <a:rPr lang="en-US" sz="1200" dirty="0" smtClean="0"/>
+              <a:t>5.4.130606</a:t>
+            </a:r>
+            <a:r>
+              <a:rPr lang="en-US" altLang="zh-CN" sz="1200" dirty="0" smtClean="0"/>
+              <a:t>)</a:t>
             </a:r>
             <a:endParaRPr lang="en-US" altLang="zh-CN" sz="1200" dirty="0" smtClean="0">
               <a:latin typeface="宋体" pitchFamily="2" charset="-122"/>
@@ -5570,6 +5634,22 @@
               </a:rPr>
               <a:t>在横屏的时候点击加载首页，加载过程中翻转到竖屏，首页的热门应用列表为空或暂无数据的问题</a:t>
             </a:r>
+            <a:r>
+              <a:rPr lang="en-US" altLang="zh-CN" sz="1200" dirty="0" smtClean="0"/>
+              <a:t>(@</a:t>
+            </a:r>
+            <a:r>
+              <a:rPr lang="en-US" altLang="zh-CN" sz="1200" dirty="0" smtClean="0"/>
+              <a:t>V</a:t>
+            </a:r>
+            <a:r>
+              <a:rPr lang="en-US" sz="1200" dirty="0" smtClean="0"/>
+              <a:t>5.4.130515</a:t>
+            </a:r>
+            <a:r>
+              <a:rPr lang="en-US" altLang="zh-CN" sz="1200" dirty="0" smtClean="0"/>
+              <a:t>)</a:t>
+            </a:r>
             <a:endParaRPr lang="en-US" altLang="zh-CN" sz="1200" dirty="0" smtClean="0">
               <a:latin typeface="宋体" pitchFamily="2" charset="-122"/>
               <a:ea typeface="宋体" pitchFamily="2" charset="-122"/>
@@ -5601,6 +5681,22 @@
               </a:rPr>
               <a:t>中去掉“禁止用户缩放”的功能</a:t>
             </a:r>
+            <a:r>
+              <a:rPr lang="en-US" altLang="zh-CN" sz="1200" smtClean="0"/>
+              <a:t>(@</a:t>
+            </a:r>
+            <a:r>
+              <a:rPr lang="en-US" altLang="zh-CN" sz="1200" smtClean="0"/>
+              <a:t>V</a:t>
+            </a:r>
+            <a:r>
+              <a:rPr lang="en-US" sz="1200" smtClean="0"/>
+              <a:t>5.4.130515</a:t>
+            </a:r>
+            <a:r>
+              <a:rPr lang="en-US" altLang="zh-CN" sz="1200" smtClean="0"/>
+              <a:t>)</a:t>
+            </a:r>
             <a:endParaRPr lang="en-US" sz="1200" dirty="0" smtClean="0">
               <a:latin typeface="宋体" pitchFamily="2" charset="-122"/>
               <a:ea typeface="宋体" pitchFamily="2" charset="-122"/>
@@ -5643,6 +5739,22 @@
               </a:rPr>
               <a:t>多次移动会导致图片不居中的问题</a:t>
             </a:r>
+            <a:r>
+              <a:rPr lang="en-US" altLang="zh-CN" sz="1200" dirty="0" smtClean="0"/>
+              <a:t>(@</a:t>
+            </a:r>
+            <a:r>
+              <a:rPr lang="en-US" altLang="zh-CN" sz="1200" dirty="0" smtClean="0"/>
+              <a:t>V</a:t>
+            </a:r>
+            <a:r>
+              <a:rPr lang="en-US" sz="1200" dirty="0" smtClean="0"/>
+              <a:t>5.4.130606</a:t>
+            </a:r>
+            <a:r>
+              <a:rPr lang="en-US" altLang="zh-CN" sz="1200" dirty="0" smtClean="0"/>
+              <a:t>)</a:t>
+            </a:r>
             <a:endParaRPr lang="en-US" altLang="zh-CN" sz="1200" dirty="0" smtClean="0">
               <a:latin typeface="宋体" pitchFamily="2" charset="-122"/>
               <a:ea typeface="宋体" pitchFamily="2" charset="-122"/>
@@ -5700,88 +5812,25 @@
               </a:rPr>
               <a:t>的话，首页数据加载不上来的问题</a:t>
             </a:r>
+            <a:r>
+              <a:rPr lang="en-US" altLang="zh-CN" sz="1200" dirty="0" smtClean="0"/>
+              <a:t>(@</a:t>
+            </a:r>
+            <a:r>
+              <a:rPr lang="en-US" altLang="zh-CN" sz="1200" dirty="0" smtClean="0"/>
+              <a:t>V</a:t>
+            </a:r>
+            <a:r>
+              <a:rPr lang="en-US" sz="1200" dirty="0" smtClean="0"/>
+              <a:t>5.4.130606</a:t>
+            </a:r>
+            <a:r>
+              <a:rPr lang="en-US" altLang="zh-CN" sz="1200" dirty="0" smtClean="0"/>
+              <a:t>)</a:t>
+            </a:r>
             <a:endParaRPr lang="en-US" altLang="zh-CN" sz="1200" dirty="0" smtClean="0">
               <a:latin typeface="宋体" pitchFamily="2" charset="-122"/>
               <a:ea typeface="宋体" pitchFamily="2" charset="-122"/>
-            </a:endParaRPr>
-          </a:p>
-          <a:p>
-            <a:pPr lvl="2" indent="274320" fontAlgn="auto">
-              <a:lnSpc>
-                <a:spcPct val="170000"/>
-              </a:lnSpc>
-              <a:spcBef>
-                <a:spcPct val="20000"/>
-              </a:spcBef>
-              <a:spcAft>
-                <a:spcPts val="0"/>
-              </a:spcAft>
-              <a:buFont typeface="Wingdings" pitchFamily="2" charset="2"/>
-              <a:buChar char="q"/>
-              <a:defRPr/>
-            </a:pPr>
-            <a:r>
-              <a:rPr lang="en-US" sz="1200" dirty="0" err="1" smtClean="0"/>
-              <a:t>PlayNow</a:t>
-            </a:r>
-            <a:r>
-              <a:rPr lang="zh-CN" altLang="en-US" sz="1200" dirty="0" smtClean="0">
-                <a:latin typeface="宋体" pitchFamily="2" charset="-122"/>
-                <a:ea typeface="宋体" pitchFamily="2" charset="-122"/>
-              </a:rPr>
-              <a:t>后台实现与接口定义不符的问题</a:t>
-            </a:r>
-            <a:endParaRPr lang="en-US" sz="1200" dirty="0" smtClean="0">
-              <a:latin typeface="宋体" pitchFamily="2" charset="-122"/>
-              <a:ea typeface="宋体" pitchFamily="2" charset="-122"/>
-            </a:endParaRPr>
-          </a:p>
-          <a:p>
-            <a:pPr lvl="2" indent="274320" fontAlgn="auto">
-              <a:lnSpc>
-                <a:spcPct val="170000"/>
-              </a:lnSpc>
-              <a:spcBef>
-                <a:spcPct val="20000"/>
-              </a:spcBef>
-              <a:spcAft>
-                <a:spcPts val="0"/>
-              </a:spcAft>
-              <a:buFont typeface="Wingdings" pitchFamily="2" charset="2"/>
-              <a:buChar char="q"/>
-              <a:defRPr/>
-            </a:pPr>
-            <a:r>
-              <a:rPr lang="en-US" sz="1200" dirty="0" smtClean="0"/>
-              <a:t>Other issues</a:t>
-            </a:r>
-            <a:endParaRPr lang="en-US" altLang="zh-CN" sz="1200" dirty="0" smtClean="0">
-              <a:solidFill>
-                <a:sysClr val="windowText" lastClr="000000"/>
-              </a:solidFill>
-              <a:latin typeface="宋体"/>
-              <a:ea typeface="宋体"/>
-            </a:endParaRPr>
-          </a:p>
-          <a:p>
-            <a:pPr marL="0" lvl="2" fontAlgn="auto">
-              <a:lnSpc>
-                <a:spcPct val="170000"/>
-              </a:lnSpc>
-              <a:spcBef>
-                <a:spcPct val="20000"/>
-              </a:spcBef>
-              <a:spcAft>
-                <a:spcPts val="0"/>
-              </a:spcAft>
-              <a:defRPr/>
-            </a:pPr>
-            <a:endParaRPr lang="en-US" altLang="en-US" sz="1200" dirty="0">
-              <a:solidFill>
-                <a:sysClr val="windowText" lastClr="000000"/>
-              </a:solidFill>
-              <a:latin typeface="宋体"/>
-              <a:ea typeface="宋体"/>
             </a:endParaRPr>
           </a:p>
         </p:txBody>

</xml_diff>